<commit_message>
update: readme, pptx, ipynb
</commit_message>
<xml_diff>
--- a/docs/Presentation_611_A14.pptx
+++ b/docs/Presentation_611_A14.pptx
@@ -1440,6 +1440,455 @@
                 <a:schemeClr val="bg1"/>
               </a:solidFill>
             </a:endParaRPr>
+          </a:p>
+        </p:txBody>
+      </p:sp>
+      <p:sp>
+        <p:nvSpPr>
+          <p:cNvPr id="5" name="Text 4">
+            <a:extLst>
+              <a:ext uri="{FF2B5EF4-FFF2-40B4-BE49-F238E27FC236}">
+                <a16:creationId xmlns:a16="http://schemas.microsoft.com/office/drawing/2014/main" id="{8571DA9E-8622-5D99-7E7B-C6A7CBF9E7B7}"/>
+              </a:ext>
+            </a:extLst>
+          </p:cNvPr>
+          <p:cNvSpPr/>
+          <p:nvPr/>
+        </p:nvSpPr>
+        <p:spPr>
+          <a:xfrm>
+            <a:off x="708503" y="3355849"/>
+            <a:ext cx="1473201" cy="274320"/>
+          </a:xfrm>
+          <a:prstGeom prst="rect">
+            <a:avLst/>
+          </a:prstGeom>
+          <a:noFill/>
+          <a:ln/>
+        </p:spPr>
+        <p:txBody>
+          <a:bodyPr wrap="square" rtlCol="0" anchor="ctr"/>
+          <a:lstStyle/>
+          <a:p>
+            <a:r>
+              <a:rPr lang="en-US" sz="2000" b="1" dirty="0">
+                <a:solidFill>
+                  <a:schemeClr val="bg1"/>
+                </a:solidFill>
+              </a:rPr>
+              <a:t>Group A14</a:t>
+            </a:r>
+            <a:endParaRPr lang="en-US" sz="2000" dirty="0">
+              <a:solidFill>
+                <a:schemeClr val="bg1"/>
+              </a:solidFill>
+            </a:endParaRPr>
+          </a:p>
+        </p:txBody>
+      </p:sp>
+      <p:sp>
+        <p:nvSpPr>
+          <p:cNvPr id="7" name="Text 4">
+            <a:extLst>
+              <a:ext uri="{FF2B5EF4-FFF2-40B4-BE49-F238E27FC236}">
+                <a16:creationId xmlns:a16="http://schemas.microsoft.com/office/drawing/2014/main" id="{A30D5808-402C-766C-1BB8-4635736CA749}"/>
+              </a:ext>
+            </a:extLst>
+          </p:cNvPr>
+          <p:cNvSpPr/>
+          <p:nvPr/>
+        </p:nvSpPr>
+        <p:spPr>
+          <a:xfrm>
+            <a:off x="708504" y="4134917"/>
+            <a:ext cx="1473201" cy="274320"/>
+          </a:xfrm>
+          <a:prstGeom prst="rect">
+            <a:avLst/>
+          </a:prstGeom>
+          <a:noFill/>
+          <a:ln/>
+        </p:spPr>
+        <p:txBody>
+          <a:bodyPr wrap="square" rtlCol="0" anchor="ctr"/>
+          <a:lstStyle/>
+          <a:p>
+            <a:r>
+              <a:rPr lang="en-GB" b="1" dirty="0">
+                <a:solidFill>
+                  <a:schemeClr val="bg1"/>
+                </a:solidFill>
+              </a:rPr>
+              <a:t>Silas </a:t>
+            </a:r>
+            <a:r>
+              <a:rPr lang="en-GB" b="1" dirty="0" err="1">
+                <a:solidFill>
+                  <a:schemeClr val="bg1"/>
+                </a:solidFill>
+              </a:rPr>
+              <a:t>Yakalim</a:t>
+            </a:r>
+            <a:endParaRPr lang="en-US" sz="2000" dirty="0">
+              <a:solidFill>
+                <a:schemeClr val="bg1"/>
+              </a:solidFill>
+            </a:endParaRPr>
+          </a:p>
+        </p:txBody>
+      </p:sp>
+      <p:sp>
+        <p:nvSpPr>
+          <p:cNvPr id="8" name="Text 4">
+            <a:extLst>
+              <a:ext uri="{FF2B5EF4-FFF2-40B4-BE49-F238E27FC236}">
+                <a16:creationId xmlns:a16="http://schemas.microsoft.com/office/drawing/2014/main" id="{B7D5EFAD-B809-9757-FA36-A773D55E7121}"/>
+              </a:ext>
+            </a:extLst>
+          </p:cNvPr>
+          <p:cNvSpPr/>
+          <p:nvPr/>
+        </p:nvSpPr>
+        <p:spPr>
+          <a:xfrm>
+            <a:off x="708503" y="4480912"/>
+            <a:ext cx="3548537" cy="274320"/>
+          </a:xfrm>
+          <a:prstGeom prst="rect">
+            <a:avLst/>
+          </a:prstGeom>
+          <a:noFill/>
+          <a:ln/>
+        </p:spPr>
+        <p:txBody>
+          <a:bodyPr wrap="square" rtlCol="0" anchor="ctr"/>
+          <a:lstStyle/>
+          <a:p>
+            <a:r>
+              <a:rPr lang="en-GB" b="1" dirty="0">
+                <a:solidFill>
+                  <a:schemeClr val="bg1"/>
+                </a:solidFill>
+              </a:rPr>
+              <a:t>Michael </a:t>
+            </a:r>
+            <a:r>
+              <a:rPr lang="en-GB" b="1" dirty="0" err="1">
+                <a:solidFill>
+                  <a:schemeClr val="bg1"/>
+                </a:solidFill>
+              </a:rPr>
+              <a:t>Etornam</a:t>
+            </a:r>
+            <a:r>
+              <a:rPr lang="en-GB" b="1" dirty="0">
+                <a:solidFill>
+                  <a:schemeClr val="bg1"/>
+                </a:solidFill>
+              </a:rPr>
+              <a:t> Kojo Agbenyegah</a:t>
+            </a:r>
+            <a:endParaRPr lang="en-US" sz="2000" dirty="0">
+              <a:solidFill>
+                <a:schemeClr val="bg1"/>
+              </a:solidFill>
+            </a:endParaRPr>
+          </a:p>
+        </p:txBody>
+      </p:sp>
+      <p:sp>
+        <p:nvSpPr>
+          <p:cNvPr id="9" name="Text 4">
+            <a:extLst>
+              <a:ext uri="{FF2B5EF4-FFF2-40B4-BE49-F238E27FC236}">
+                <a16:creationId xmlns:a16="http://schemas.microsoft.com/office/drawing/2014/main" id="{DFF48B06-F854-7E54-8EDA-D81E4F0C0A25}"/>
+              </a:ext>
+            </a:extLst>
+          </p:cNvPr>
+          <p:cNvSpPr/>
+          <p:nvPr/>
+        </p:nvSpPr>
+        <p:spPr>
+          <a:xfrm>
+            <a:off x="708503" y="4826907"/>
+            <a:ext cx="1933098" cy="274320"/>
+          </a:xfrm>
+          <a:prstGeom prst="rect">
+            <a:avLst/>
+          </a:prstGeom>
+          <a:noFill/>
+          <a:ln/>
+        </p:spPr>
+        <p:txBody>
+          <a:bodyPr wrap="square" rtlCol="0" anchor="ctr"/>
+          <a:lstStyle/>
+          <a:p>
+            <a:r>
+              <a:rPr lang="en-GB" b="1" dirty="0">
+                <a:solidFill>
+                  <a:schemeClr val="bg1"/>
+                </a:solidFill>
+              </a:rPr>
+              <a:t>Emmanuel Asante</a:t>
+            </a:r>
+            <a:endParaRPr lang="en-US" sz="2000" dirty="0">
+              <a:solidFill>
+                <a:schemeClr val="bg1"/>
+              </a:solidFill>
+            </a:endParaRPr>
+          </a:p>
+        </p:txBody>
+      </p:sp>
+      <p:sp>
+        <p:nvSpPr>
+          <p:cNvPr id="10" name="Text 4">
+            <a:extLst>
+              <a:ext uri="{FF2B5EF4-FFF2-40B4-BE49-F238E27FC236}">
+                <a16:creationId xmlns:a16="http://schemas.microsoft.com/office/drawing/2014/main" id="{29EB0D80-2AB8-1CC2-5951-C5F7D6E58D60}"/>
+              </a:ext>
+            </a:extLst>
+          </p:cNvPr>
+          <p:cNvSpPr/>
+          <p:nvPr/>
+        </p:nvSpPr>
+        <p:spPr>
+          <a:xfrm>
+            <a:off x="708503" y="5172902"/>
+            <a:ext cx="1933098" cy="274320"/>
+          </a:xfrm>
+          <a:prstGeom prst="rect">
+            <a:avLst/>
+          </a:prstGeom>
+          <a:noFill/>
+          <a:ln/>
+        </p:spPr>
+        <p:txBody>
+          <a:bodyPr wrap="square" rtlCol="0" anchor="ctr"/>
+          <a:lstStyle/>
+          <a:p>
+            <a:r>
+              <a:rPr lang="en-GB" b="1" dirty="0">
+                <a:solidFill>
+                  <a:schemeClr val="bg1"/>
+                </a:solidFill>
+              </a:rPr>
+              <a:t>Benjamin Ofori</a:t>
+            </a:r>
+            <a:endParaRPr lang="en-US" sz="2000" dirty="0">
+              <a:solidFill>
+                <a:schemeClr val="bg1"/>
+              </a:solidFill>
+            </a:endParaRPr>
+          </a:p>
+        </p:txBody>
+      </p:sp>
+      <p:sp>
+        <p:nvSpPr>
+          <p:cNvPr id="11" name="Text 4">
+            <a:extLst>
+              <a:ext uri="{FF2B5EF4-FFF2-40B4-BE49-F238E27FC236}">
+                <a16:creationId xmlns:a16="http://schemas.microsoft.com/office/drawing/2014/main" id="{A347D028-B317-0652-29FC-9BCEEA899489}"/>
+              </a:ext>
+            </a:extLst>
+          </p:cNvPr>
+          <p:cNvSpPr/>
+          <p:nvPr/>
+        </p:nvSpPr>
+        <p:spPr>
+          <a:xfrm>
+            <a:off x="4257040" y="4134917"/>
+            <a:ext cx="1473201" cy="274320"/>
+          </a:xfrm>
+          <a:prstGeom prst="rect">
+            <a:avLst/>
+          </a:prstGeom>
+          <a:noFill/>
+          <a:ln/>
+        </p:spPr>
+        <p:txBody>
+          <a:bodyPr wrap="square" rtlCol="0" anchor="ctr"/>
+          <a:lstStyle/>
+          <a:p>
+            <a:r>
+              <a:rPr lang="en-GB" b="1" dirty="0">
+                <a:solidFill>
+                  <a:schemeClr val="bg1"/>
+                </a:solidFill>
+              </a:rPr>
+              <a:t>22424586</a:t>
+            </a:r>
+            <a:endParaRPr lang="en-US" sz="2000" dirty="0">
+              <a:solidFill>
+                <a:schemeClr val="bg1"/>
+              </a:solidFill>
+            </a:endParaRPr>
+          </a:p>
+        </p:txBody>
+      </p:sp>
+      <p:sp>
+        <p:nvSpPr>
+          <p:cNvPr id="12" name="Text 4">
+            <a:extLst>
+              <a:ext uri="{FF2B5EF4-FFF2-40B4-BE49-F238E27FC236}">
+                <a16:creationId xmlns:a16="http://schemas.microsoft.com/office/drawing/2014/main" id="{E7A0E549-4EDB-6428-0E0B-0C135667D5DF}"/>
+              </a:ext>
+            </a:extLst>
+          </p:cNvPr>
+          <p:cNvSpPr/>
+          <p:nvPr/>
+        </p:nvSpPr>
+        <p:spPr>
+          <a:xfrm>
+            <a:off x="4257039" y="4488438"/>
+            <a:ext cx="1473201" cy="274320"/>
+          </a:xfrm>
+          <a:prstGeom prst="rect">
+            <a:avLst/>
+          </a:prstGeom>
+          <a:noFill/>
+          <a:ln/>
+        </p:spPr>
+        <p:txBody>
+          <a:bodyPr wrap="square" rtlCol="0" anchor="ctr"/>
+          <a:lstStyle/>
+          <a:p>
+            <a:r>
+              <a:rPr lang="en-GB" b="1" dirty="0">
+                <a:solidFill>
+                  <a:schemeClr val="bg1"/>
+                </a:solidFill>
+              </a:rPr>
+              <a:t>22425717</a:t>
+            </a:r>
+            <a:endParaRPr lang="en-US" sz="2000" dirty="0">
+              <a:solidFill>
+                <a:schemeClr val="bg1"/>
+              </a:solidFill>
+            </a:endParaRPr>
+          </a:p>
+        </p:txBody>
+      </p:sp>
+      <p:sp>
+        <p:nvSpPr>
+          <p:cNvPr id="13" name="Text 4">
+            <a:extLst>
+              <a:ext uri="{FF2B5EF4-FFF2-40B4-BE49-F238E27FC236}">
+                <a16:creationId xmlns:a16="http://schemas.microsoft.com/office/drawing/2014/main" id="{EAD6D706-D464-0605-C879-577ACB72634F}"/>
+              </a:ext>
+            </a:extLst>
+          </p:cNvPr>
+          <p:cNvSpPr/>
+          <p:nvPr/>
+        </p:nvSpPr>
+        <p:spPr>
+          <a:xfrm>
+            <a:off x="4257038" y="4841959"/>
+            <a:ext cx="1473201" cy="274320"/>
+          </a:xfrm>
+          <a:prstGeom prst="rect">
+            <a:avLst/>
+          </a:prstGeom>
+          <a:noFill/>
+          <a:ln/>
+        </p:spPr>
+        <p:txBody>
+          <a:bodyPr wrap="square" rtlCol="0" anchor="ctr"/>
+          <a:lstStyle/>
+          <a:p>
+            <a:r>
+              <a:rPr lang="en-GB" b="1" dirty="0">
+                <a:solidFill>
+                  <a:schemeClr val="bg1"/>
+                </a:solidFill>
+              </a:rPr>
+              <a:t>22424587</a:t>
+            </a:r>
+            <a:endParaRPr lang="en-US" sz="2000" dirty="0">
+              <a:solidFill>
+                <a:schemeClr val="bg1"/>
+              </a:solidFill>
+            </a:endParaRPr>
+          </a:p>
+        </p:txBody>
+      </p:sp>
+      <p:sp>
+        <p:nvSpPr>
+          <p:cNvPr id="14" name="Text 4">
+            <a:extLst>
+              <a:ext uri="{FF2B5EF4-FFF2-40B4-BE49-F238E27FC236}">
+                <a16:creationId xmlns:a16="http://schemas.microsoft.com/office/drawing/2014/main" id="{E2B3754D-0E3E-B633-6006-60C5CFC98797}"/>
+              </a:ext>
+            </a:extLst>
+          </p:cNvPr>
+          <p:cNvSpPr/>
+          <p:nvPr/>
+        </p:nvSpPr>
+        <p:spPr>
+          <a:xfrm>
+            <a:off x="4257037" y="5195480"/>
+            <a:ext cx="1473201" cy="274320"/>
+          </a:xfrm>
+          <a:prstGeom prst="rect">
+            <a:avLst/>
+          </a:prstGeom>
+          <a:noFill/>
+          <a:ln/>
+        </p:spPr>
+        <p:txBody>
+          <a:bodyPr wrap="square" rtlCol="0" anchor="ctr"/>
+          <a:lstStyle/>
+          <a:p>
+            <a:r>
+              <a:rPr lang="en-GB" b="1" dirty="0">
+                <a:solidFill>
+                  <a:schemeClr val="bg1"/>
+                </a:solidFill>
+              </a:rPr>
+              <a:t>22424701</a:t>
+            </a:r>
+            <a:endParaRPr lang="en-US" sz="2000" dirty="0">
+              <a:solidFill>
+                <a:schemeClr val="bg1"/>
+              </a:solidFill>
+            </a:endParaRPr>
+          </a:p>
+        </p:txBody>
+      </p:sp>
+      <p:sp>
+        <p:nvSpPr>
+          <p:cNvPr id="16" name="Shape 1">
+            <a:extLst>
+              <a:ext uri="{FF2B5EF4-FFF2-40B4-BE49-F238E27FC236}">
+                <a16:creationId xmlns:a16="http://schemas.microsoft.com/office/drawing/2014/main" id="{707F51F0-A132-CD02-CDAB-AA07246FF42A}"/>
+              </a:ext>
+            </a:extLst>
+          </p:cNvPr>
+          <p:cNvSpPr/>
+          <p:nvPr/>
+        </p:nvSpPr>
+        <p:spPr>
+          <a:xfrm>
+            <a:off x="731520" y="3829097"/>
+            <a:ext cx="2194560" cy="73152"/>
+          </a:xfrm>
+          <a:prstGeom prst="rect">
+            <a:avLst/>
+          </a:prstGeom>
+          <a:solidFill>
+            <a:srgbClr val="00B14F"/>
+          </a:solidFill>
+          <a:ln w="12700">
+            <a:solidFill>
+              <a:srgbClr val="00B14F"/>
+            </a:solidFill>
+            <a:prstDash val="solid"/>
+          </a:ln>
+        </p:spPr>
+        <p:txBody>
+          <a:bodyPr/>
+          <a:lstStyle/>
+          <a:p>
+            <a:endParaRPr lang="en-GH"/>
           </a:p>
         </p:txBody>
       </p:sp>

</xml_diff>